<commit_message>
add reference,code and Lecture08
</commit_message>
<xml_diff>
--- a/Lecture06/数学建模第六讲-查永春.pptx
+++ b/Lecture06/数学建模第六讲-查永春.pptx
@@ -295,7 +295,7 @@
           <a:p>
             <a:fld id="{717742FC-62BB-4B81-9CA5-3B750A4B4580}" type="datetimeFigureOut">
               <a:rPr lang="zh-CN" altLang="en-US" smtClean="0"/>
-              <a:t>2019/10/10</a:t>
+              <a:t>2019/10/11</a:t>
             </a:fld>
             <a:endParaRPr lang="zh-CN" altLang="en-US"/>
           </a:p>
@@ -461,7 +461,7 @@
             </a:pPr>
             <a:fld id="{06024D97-E667-405D-B634-E583E2108D71}" type="datetimeFigureOut">
               <a:rPr lang="zh-CN" altLang="en-US"/>
-              <a:t>2019/10/10</a:t>
+              <a:t>2019/10/11</a:t>
             </a:fld>
             <a:endParaRPr lang="zh-CN" altLang="en-US"/>
           </a:p>
@@ -3207,7 +3207,7 @@
           <a:p>
             <a:fld id="{43A93E93-166D-47F5-9EF1-ACEABE24AEEA}" type="datetimeFigureOut">
               <a:rPr lang="zh-CN" altLang="en-US" smtClean="0"/>
-              <a:t>2019/10/10</a:t>
+              <a:t>2019/10/11</a:t>
             </a:fld>
             <a:endParaRPr lang="zh-CN" altLang="en-US"/>
           </a:p>
@@ -4528,11 +4528,11 @@
   <p:clrMapOvr>
     <a:masterClrMapping/>
   </p:clrMapOvr>
-  <mc:AlternateContent xmlns:mc="http://schemas.openxmlformats.org/markup-compatibility/2006">
-    <mc:Choice xmlns:p14="http://schemas.microsoft.com/office/powerpoint/2010/main" Requires="p14">
+  <mc:AlternateContent xmlns:mc="http://schemas.openxmlformats.org/markup-compatibility/2006" xmlns:p14="http://schemas.microsoft.com/office/powerpoint/2010/main">
+    <mc:Choice Requires="p14">
       <p:transition p14:dur="0" advTm="0"/>
     </mc:Choice>
-    <mc:Fallback>
+    <mc:Fallback xmlns="">
       <p:transition advTm="0"/>
     </mc:Fallback>
   </mc:AlternateContent>
@@ -5217,11 +5217,11 @@
   <p:clrMapOvr>
     <a:masterClrMapping/>
   </p:clrMapOvr>
-  <mc:AlternateContent xmlns:mc="http://schemas.openxmlformats.org/markup-compatibility/2006">
-    <mc:Choice xmlns:p14="http://schemas.microsoft.com/office/powerpoint/2010/main" Requires="p14">
+  <mc:AlternateContent xmlns:mc="http://schemas.openxmlformats.org/markup-compatibility/2006" xmlns:p14="http://schemas.microsoft.com/office/powerpoint/2010/main">
+    <mc:Choice Requires="p14">
       <p:transition p14:dur="0" advTm="0"/>
     </mc:Choice>
-    <mc:Fallback>
+    <mc:Fallback xmlns="">
       <p:transition advTm="0"/>
     </mc:Fallback>
   </mc:AlternateContent>
@@ -5728,11 +5728,11 @@
   <p:clrMapOvr>
     <a:masterClrMapping/>
   </p:clrMapOvr>
-  <mc:AlternateContent xmlns:mc="http://schemas.openxmlformats.org/markup-compatibility/2006">
-    <mc:Choice xmlns:p14="http://schemas.microsoft.com/office/powerpoint/2010/main" Requires="p14">
+  <mc:AlternateContent xmlns:mc="http://schemas.openxmlformats.org/markup-compatibility/2006" xmlns:p14="http://schemas.microsoft.com/office/powerpoint/2010/main">
+    <mc:Choice Requires="p14">
       <p:transition p14:dur="0" advTm="0"/>
     </mc:Choice>
-    <mc:Fallback>
+    <mc:Fallback xmlns="">
       <p:transition advTm="0"/>
     </mc:Fallback>
   </mc:AlternateContent>
@@ -6762,11 +6762,11 @@
   <p:clrMapOvr>
     <a:masterClrMapping/>
   </p:clrMapOvr>
-  <mc:AlternateContent xmlns:mc="http://schemas.openxmlformats.org/markup-compatibility/2006">
-    <mc:Choice xmlns:p14="http://schemas.microsoft.com/office/powerpoint/2010/main" Requires="p14">
+  <mc:AlternateContent xmlns:mc="http://schemas.openxmlformats.org/markup-compatibility/2006" xmlns:p14="http://schemas.microsoft.com/office/powerpoint/2010/main">
+    <mc:Choice Requires="p14">
       <p:transition p14:dur="0" advTm="0"/>
     </mc:Choice>
-    <mc:Fallback>
+    <mc:Fallback xmlns="">
       <p:transition advTm="0"/>
     </mc:Fallback>
   </mc:AlternateContent>
@@ -7884,11 +7884,11 @@
   <p:clrMapOvr>
     <a:masterClrMapping/>
   </p:clrMapOvr>
-  <mc:AlternateContent xmlns:mc="http://schemas.openxmlformats.org/markup-compatibility/2006">
-    <mc:Choice xmlns:p14="http://schemas.microsoft.com/office/powerpoint/2010/main" Requires="p14">
+  <mc:AlternateContent xmlns:mc="http://schemas.openxmlformats.org/markup-compatibility/2006" xmlns:p14="http://schemas.microsoft.com/office/powerpoint/2010/main">
+    <mc:Choice Requires="p14">
       <p:transition p14:dur="0" advTm="0"/>
     </mc:Choice>
-    <mc:Fallback>
+    <mc:Fallback xmlns="">
       <p:transition advTm="0"/>
     </mc:Fallback>
   </mc:AlternateContent>
@@ -8383,11 +8383,11 @@
   <p:clrMapOvr>
     <a:masterClrMapping/>
   </p:clrMapOvr>
-  <mc:AlternateContent xmlns:mc="http://schemas.openxmlformats.org/markup-compatibility/2006">
-    <mc:Choice xmlns:p14="http://schemas.microsoft.com/office/powerpoint/2010/main" Requires="p14">
+  <mc:AlternateContent xmlns:mc="http://schemas.openxmlformats.org/markup-compatibility/2006" xmlns:p14="http://schemas.microsoft.com/office/powerpoint/2010/main">
+    <mc:Choice Requires="p14">
       <p:transition p14:dur="0" advTm="0"/>
     </mc:Choice>
-    <mc:Fallback>
+    <mc:Fallback xmlns="">
       <p:transition advTm="0"/>
     </mc:Fallback>
   </mc:AlternateContent>
@@ -9001,11 +9001,11 @@
   <p:clrMapOvr>
     <a:masterClrMapping/>
   </p:clrMapOvr>
-  <mc:AlternateContent xmlns:mc="http://schemas.openxmlformats.org/markup-compatibility/2006">
-    <mc:Choice xmlns:p14="http://schemas.microsoft.com/office/powerpoint/2010/main" Requires="p14">
+  <mc:AlternateContent xmlns:mc="http://schemas.openxmlformats.org/markup-compatibility/2006" xmlns:p14="http://schemas.microsoft.com/office/powerpoint/2010/main">
+    <mc:Choice Requires="p14">
       <p:transition p14:dur="0" advTm="0"/>
     </mc:Choice>
-    <mc:Fallback>
+    <mc:Fallback xmlns="">
       <p:transition advTm="0"/>
     </mc:Fallback>
   </mc:AlternateContent>
@@ -9473,11 +9473,11 @@
   <p:clrMapOvr>
     <a:masterClrMapping/>
   </p:clrMapOvr>
-  <mc:AlternateContent xmlns:mc="http://schemas.openxmlformats.org/markup-compatibility/2006">
-    <mc:Choice xmlns:p14="http://schemas.microsoft.com/office/powerpoint/2010/main" Requires="p14">
+  <mc:AlternateContent xmlns:mc="http://schemas.openxmlformats.org/markup-compatibility/2006" xmlns:p14="http://schemas.microsoft.com/office/powerpoint/2010/main">
+    <mc:Choice Requires="p14">
       <p:transition p14:dur="0" advTm="0"/>
     </mc:Choice>
-    <mc:Fallback>
+    <mc:Fallback xmlns="">
       <p:transition advTm="0"/>
     </mc:Fallback>
   </mc:AlternateContent>
@@ -9779,8 +9779,8 @@
           </p:sp>
         </p:grpSp>
       </p:grpSp>
-      <mc:AlternateContent xmlns:mc="http://schemas.openxmlformats.org/markup-compatibility/2006">
-        <mc:Choice xmlns:a14="http://schemas.microsoft.com/office/drawing/2010/main" Requires="a14">
+      <mc:AlternateContent xmlns:mc="http://schemas.openxmlformats.org/markup-compatibility/2006" xmlns:a14="http://schemas.microsoft.com/office/drawing/2010/main">
+        <mc:Choice Requires="a14">
           <p:sp>
             <p:nvSpPr>
               <p:cNvPr id="13" name="Rectangle 26">
@@ -10074,7 +10074,7 @@
             </p:txBody>
           </p:sp>
         </mc:Choice>
-        <mc:Fallback>
+        <mc:Fallback xmlns="">
           <p:sp>
             <p:nvSpPr>
               <p:cNvPr id="13" name="Rectangle 26">
@@ -10165,11 +10165,11 @@
   <p:clrMapOvr>
     <a:masterClrMapping/>
   </p:clrMapOvr>
-  <mc:AlternateContent xmlns:mc="http://schemas.openxmlformats.org/markup-compatibility/2006">
-    <mc:Choice xmlns:p14="http://schemas.microsoft.com/office/powerpoint/2010/main" Requires="p14">
+  <mc:AlternateContent xmlns:mc="http://schemas.openxmlformats.org/markup-compatibility/2006" xmlns:p14="http://schemas.microsoft.com/office/powerpoint/2010/main">
+    <mc:Choice Requires="p14">
       <p:transition p14:dur="0" advTm="0"/>
     </mc:Choice>
-    <mc:Fallback>
+    <mc:Fallback xmlns="">
       <p:transition advTm="0"/>
     </mc:Fallback>
   </mc:AlternateContent>
@@ -10510,11 +10510,11 @@
   <p:clrMapOvr>
     <a:masterClrMapping/>
   </p:clrMapOvr>
-  <mc:AlternateContent xmlns:mc="http://schemas.openxmlformats.org/markup-compatibility/2006">
-    <mc:Choice xmlns:p14="http://schemas.microsoft.com/office/powerpoint/2010/main" Requires="p14">
+  <mc:AlternateContent xmlns:mc="http://schemas.openxmlformats.org/markup-compatibility/2006" xmlns:p14="http://schemas.microsoft.com/office/powerpoint/2010/main">
+    <mc:Choice Requires="p14">
       <p:transition p14:dur="0" advTm="0"/>
     </mc:Choice>
-    <mc:Fallback>
+    <mc:Fallback xmlns="">
       <p:transition advTm="0"/>
     </mc:Fallback>
   </mc:AlternateContent>
@@ -11365,11 +11365,11 @@
   <p:clrMapOvr>
     <a:masterClrMapping/>
   </p:clrMapOvr>
-  <mc:AlternateContent xmlns:mc="http://schemas.openxmlformats.org/markup-compatibility/2006">
-    <mc:Choice xmlns:p14="http://schemas.microsoft.com/office/powerpoint/2010/main" Requires="p14">
+  <mc:AlternateContent xmlns:mc="http://schemas.openxmlformats.org/markup-compatibility/2006" xmlns:p14="http://schemas.microsoft.com/office/powerpoint/2010/main">
+    <mc:Choice Requires="p14">
       <p:transition p14:dur="0" advTm="0"/>
     </mc:Choice>
-    <mc:Fallback>
+    <mc:Fallback xmlns="">
       <p:transition advTm="0"/>
     </mc:Fallback>
   </mc:AlternateContent>
@@ -11501,7 +11501,19 @@
                 <a:latin typeface="黑体" panose="02010609060101010101" pitchFamily="49" charset="-122"/>
                 <a:ea typeface="黑体" panose="02010609060101010101" pitchFamily="49" charset="-122"/>
               </a:rPr>
-              <a:t>https://github.com/yooongchun/MatlabCourse/tree/master/Lecture6</a:t>
+              <a:t>https://github.com/yooongchun/MatlabCourse/tree/master</a:t>
+            </a:r>
+            <a:r>
+              <a:rPr lang="en-US" altLang="zh-CN" sz="2800">
+                <a:solidFill>
+                  <a:schemeClr val="accent1">
+                    <a:lumMod val="75000"/>
+                  </a:schemeClr>
+                </a:solidFill>
+                <a:latin typeface="黑体" panose="02010609060101010101" pitchFamily="49" charset="-122"/>
+                <a:ea typeface="黑体" panose="02010609060101010101" pitchFamily="49" charset="-122"/>
+              </a:rPr>
+              <a:t>/Lecture06</a:t>
             </a:r>
             <a:endParaRPr lang="zh-CN" altLang="en-US" sz="2800" dirty="0">
               <a:solidFill>
@@ -11892,11 +11904,11 @@
   <p:clrMapOvr>
     <a:masterClrMapping/>
   </p:clrMapOvr>
-  <mc:AlternateContent xmlns:mc="http://schemas.openxmlformats.org/markup-compatibility/2006">
-    <mc:Choice xmlns:p14="http://schemas.microsoft.com/office/powerpoint/2010/main" Requires="p14">
+  <mc:AlternateContent xmlns:mc="http://schemas.openxmlformats.org/markup-compatibility/2006" xmlns:p14="http://schemas.microsoft.com/office/powerpoint/2010/main">
+    <mc:Choice Requires="p14">
       <p:transition p14:dur="0" advTm="0"/>
     </mc:Choice>
-    <mc:Fallback>
+    <mc:Fallback xmlns="">
       <p:transition advTm="0"/>
     </mc:Fallback>
   </mc:AlternateContent>
@@ -12368,11 +12380,11 @@
   <p:clrMapOvr>
     <a:masterClrMapping/>
   </p:clrMapOvr>
-  <mc:AlternateContent xmlns:mc="http://schemas.openxmlformats.org/markup-compatibility/2006">
-    <mc:Choice xmlns:p14="http://schemas.microsoft.com/office/powerpoint/2010/main" Requires="p14">
+  <mc:AlternateContent xmlns:mc="http://schemas.openxmlformats.org/markup-compatibility/2006" xmlns:p14="http://schemas.microsoft.com/office/powerpoint/2010/main">
+    <mc:Choice Requires="p14">
       <p:transition p14:dur="0" advTm="0"/>
     </mc:Choice>
-    <mc:Fallback>
+    <mc:Fallback xmlns="">
       <p:transition advTm="0"/>
     </mc:Fallback>
   </mc:AlternateContent>
@@ -12713,11 +12725,11 @@
   <p:clrMapOvr>
     <a:masterClrMapping/>
   </p:clrMapOvr>
-  <mc:AlternateContent xmlns:mc="http://schemas.openxmlformats.org/markup-compatibility/2006">
-    <mc:Choice xmlns:p14="http://schemas.microsoft.com/office/powerpoint/2010/main" Requires="p14">
+  <mc:AlternateContent xmlns:mc="http://schemas.openxmlformats.org/markup-compatibility/2006" xmlns:p14="http://schemas.microsoft.com/office/powerpoint/2010/main">
+    <mc:Choice Requires="p14">
       <p:transition p14:dur="0" advTm="0"/>
     </mc:Choice>
-    <mc:Fallback>
+    <mc:Fallback xmlns="">
       <p:transition advTm="0"/>
     </mc:Fallback>
   </mc:AlternateContent>
@@ -13459,11 +13471,11 @@
   <p:clrMapOvr>
     <a:masterClrMapping/>
   </p:clrMapOvr>
-  <mc:AlternateContent xmlns:mc="http://schemas.openxmlformats.org/markup-compatibility/2006">
-    <mc:Choice xmlns:p14="http://schemas.microsoft.com/office/powerpoint/2010/main" Requires="p14">
+  <mc:AlternateContent xmlns:mc="http://schemas.openxmlformats.org/markup-compatibility/2006" xmlns:p14="http://schemas.microsoft.com/office/powerpoint/2010/main">
+    <mc:Choice Requires="p14">
       <p:transition p14:dur="0" advTm="0"/>
     </mc:Choice>
-    <mc:Fallback>
+    <mc:Fallback xmlns="">
       <p:transition advTm="0"/>
     </mc:Fallback>
   </mc:AlternateContent>
@@ -14155,11 +14167,11 @@
   <p:clrMapOvr>
     <a:masterClrMapping/>
   </p:clrMapOvr>
-  <mc:AlternateContent xmlns:mc="http://schemas.openxmlformats.org/markup-compatibility/2006">
-    <mc:Choice xmlns:p14="http://schemas.microsoft.com/office/powerpoint/2010/main" Requires="p14">
+  <mc:AlternateContent xmlns:mc="http://schemas.openxmlformats.org/markup-compatibility/2006" xmlns:p14="http://schemas.microsoft.com/office/powerpoint/2010/main">
+    <mc:Choice Requires="p14">
       <p:transition p14:dur="0" advTm="0"/>
     </mc:Choice>
-    <mc:Fallback>
+    <mc:Fallback xmlns="">
       <p:transition advTm="0"/>
     </mc:Fallback>
   </mc:AlternateContent>
@@ -14595,11 +14607,11 @@
   <p:clrMapOvr>
     <a:masterClrMapping/>
   </p:clrMapOvr>
-  <mc:AlternateContent xmlns:mc="http://schemas.openxmlformats.org/markup-compatibility/2006">
-    <mc:Choice xmlns:p14="http://schemas.microsoft.com/office/powerpoint/2010/main" Requires="p14">
+  <mc:AlternateContent xmlns:mc="http://schemas.openxmlformats.org/markup-compatibility/2006" xmlns:p14="http://schemas.microsoft.com/office/powerpoint/2010/main">
+    <mc:Choice Requires="p14">
       <p:transition p14:dur="10" advTm="0"/>
     </mc:Choice>
-    <mc:Fallback>
+    <mc:Fallback xmlns="">
       <p:transition advTm="0"/>
     </mc:Fallback>
   </mc:AlternateContent>
@@ -14940,11 +14952,11 @@
   <p:clrMapOvr>
     <a:masterClrMapping/>
   </p:clrMapOvr>
-  <mc:AlternateContent xmlns:mc="http://schemas.openxmlformats.org/markup-compatibility/2006">
-    <mc:Choice xmlns:p14="http://schemas.microsoft.com/office/powerpoint/2010/main" Requires="p14">
+  <mc:AlternateContent xmlns:mc="http://schemas.openxmlformats.org/markup-compatibility/2006" xmlns:p14="http://schemas.microsoft.com/office/powerpoint/2010/main">
+    <mc:Choice Requires="p14">
       <p:transition p14:dur="0" advTm="0"/>
     </mc:Choice>
-    <mc:Fallback>
+    <mc:Fallback xmlns="">
       <p:transition advTm="0"/>
     </mc:Fallback>
   </mc:AlternateContent>
@@ -16990,11 +17002,11 @@
   <p:clrMapOvr>
     <a:masterClrMapping/>
   </p:clrMapOvr>
-  <mc:AlternateContent xmlns:mc="http://schemas.openxmlformats.org/markup-compatibility/2006">
-    <mc:Choice xmlns:p14="http://schemas.microsoft.com/office/powerpoint/2010/main" Requires="p14">
+  <mc:AlternateContent xmlns:mc="http://schemas.openxmlformats.org/markup-compatibility/2006" xmlns:p14="http://schemas.microsoft.com/office/powerpoint/2010/main">
+    <mc:Choice Requires="p14">
       <p:transition p14:dur="0" advTm="0"/>
     </mc:Choice>
-    <mc:Fallback>
+    <mc:Fallback xmlns="">
       <p:transition advTm="0"/>
     </mc:Fallback>
   </mc:AlternateContent>
@@ -17164,11 +17176,11 @@
   <p:clrMapOvr>
     <a:masterClrMapping/>
   </p:clrMapOvr>
-  <mc:AlternateContent xmlns:mc="http://schemas.openxmlformats.org/markup-compatibility/2006">
-    <mc:Choice xmlns:p14="http://schemas.microsoft.com/office/powerpoint/2010/main" Requires="p14">
+  <mc:AlternateContent xmlns:mc="http://schemas.openxmlformats.org/markup-compatibility/2006" xmlns:p14="http://schemas.microsoft.com/office/powerpoint/2010/main">
+    <mc:Choice Requires="p14">
       <p:transition p14:dur="10" advTm="0"/>
     </mc:Choice>
-    <mc:Fallback>
+    <mc:Fallback xmlns="">
       <p:transition advTm="0"/>
     </mc:Fallback>
   </mc:AlternateContent>
@@ -18731,11 +18743,11 @@
   <p:clrMapOvr>
     <a:masterClrMapping/>
   </p:clrMapOvr>
-  <mc:AlternateContent xmlns:mc="http://schemas.openxmlformats.org/markup-compatibility/2006">
-    <mc:Choice xmlns:p14="http://schemas.microsoft.com/office/powerpoint/2010/main" Requires="p14">
+  <mc:AlternateContent xmlns:mc="http://schemas.openxmlformats.org/markup-compatibility/2006" xmlns:p14="http://schemas.microsoft.com/office/powerpoint/2010/main">
+    <mc:Choice Requires="p14">
       <p:transition p14:dur="0" advTm="0"/>
     </mc:Choice>
-    <mc:Fallback>
+    <mc:Fallback xmlns="">
       <p:transition advTm="0"/>
     </mc:Fallback>
   </mc:AlternateContent>
@@ -19076,11 +19088,11 @@
   <p:clrMapOvr>
     <a:masterClrMapping/>
   </p:clrMapOvr>
-  <mc:AlternateContent xmlns:mc="http://schemas.openxmlformats.org/markup-compatibility/2006">
-    <mc:Choice xmlns:p14="http://schemas.microsoft.com/office/powerpoint/2010/main" Requires="p14">
+  <mc:AlternateContent xmlns:mc="http://schemas.openxmlformats.org/markup-compatibility/2006" xmlns:p14="http://schemas.microsoft.com/office/powerpoint/2010/main">
+    <mc:Choice Requires="p14">
       <p:transition p14:dur="10" advTm="0"/>
     </mc:Choice>
-    <mc:Fallback>
+    <mc:Fallback xmlns="">
       <p:transition advTm="0"/>
     </mc:Fallback>
   </mc:AlternateContent>
@@ -19803,11 +19815,11 @@
   <p:clrMapOvr>
     <a:masterClrMapping/>
   </p:clrMapOvr>
-  <mc:AlternateContent xmlns:mc="http://schemas.openxmlformats.org/markup-compatibility/2006">
-    <mc:Choice xmlns:p14="http://schemas.microsoft.com/office/powerpoint/2010/main" Requires="p14">
+  <mc:AlternateContent xmlns:mc="http://schemas.openxmlformats.org/markup-compatibility/2006" xmlns:p14="http://schemas.microsoft.com/office/powerpoint/2010/main">
+    <mc:Choice Requires="p14">
       <p:transition p14:dur="10" advTm="0"/>
     </mc:Choice>
-    <mc:Fallback>
+    <mc:Fallback xmlns="">
       <p:transition advTm="0"/>
     </mc:Fallback>
   </mc:AlternateContent>
@@ -20691,11 +20703,11 @@
   <p:clrMapOvr>
     <a:masterClrMapping/>
   </p:clrMapOvr>
-  <mc:AlternateContent xmlns:mc="http://schemas.openxmlformats.org/markup-compatibility/2006">
-    <mc:Choice xmlns:p14="http://schemas.microsoft.com/office/powerpoint/2010/main" Requires="p14">
+  <mc:AlternateContent xmlns:mc="http://schemas.openxmlformats.org/markup-compatibility/2006" xmlns:p14="http://schemas.microsoft.com/office/powerpoint/2010/main">
+    <mc:Choice Requires="p14">
       <p:transition p14:dur="0" advTm="0"/>
     </mc:Choice>
-    <mc:Fallback>
+    <mc:Fallback xmlns="">
       <p:transition advTm="0"/>
     </mc:Fallback>
   </mc:AlternateContent>
@@ -21137,11 +21149,11 @@
   <p:clrMapOvr>
     <a:masterClrMapping/>
   </p:clrMapOvr>
-  <mc:AlternateContent xmlns:mc="http://schemas.openxmlformats.org/markup-compatibility/2006">
-    <mc:Choice xmlns:p14="http://schemas.microsoft.com/office/powerpoint/2010/main" Requires="p14">
+  <mc:AlternateContent xmlns:mc="http://schemas.openxmlformats.org/markup-compatibility/2006" xmlns:p14="http://schemas.microsoft.com/office/powerpoint/2010/main">
+    <mc:Choice Requires="p14">
       <p:transition p14:dur="0" advTm="0"/>
     </mc:Choice>
-    <mc:Fallback>
+    <mc:Fallback xmlns="">
       <p:transition advTm="0"/>
     </mc:Fallback>
   </mc:AlternateContent>
@@ -21482,11 +21494,11 @@
   <p:clrMapOvr>
     <a:masterClrMapping/>
   </p:clrMapOvr>
-  <mc:AlternateContent xmlns:mc="http://schemas.openxmlformats.org/markup-compatibility/2006">
-    <mc:Choice xmlns:p14="http://schemas.microsoft.com/office/powerpoint/2010/main" Requires="p14">
+  <mc:AlternateContent xmlns:mc="http://schemas.openxmlformats.org/markup-compatibility/2006" xmlns:p14="http://schemas.microsoft.com/office/powerpoint/2010/main">
+    <mc:Choice Requires="p14">
       <p:transition p14:dur="0" advTm="0"/>
     </mc:Choice>
-    <mc:Fallback>
+    <mc:Fallback xmlns="">
       <p:transition advTm="0"/>
     </mc:Fallback>
   </mc:AlternateContent>
@@ -22008,11 +22020,11 @@
   <p:clrMapOvr>
     <a:masterClrMapping/>
   </p:clrMapOvr>
-  <mc:AlternateContent xmlns:mc="http://schemas.openxmlformats.org/markup-compatibility/2006">
-    <mc:Choice xmlns:p14="http://schemas.microsoft.com/office/powerpoint/2010/main" Requires="p14">
+  <mc:AlternateContent xmlns:mc="http://schemas.openxmlformats.org/markup-compatibility/2006" xmlns:p14="http://schemas.microsoft.com/office/powerpoint/2010/main">
+    <mc:Choice Requires="p14">
       <p:transition p14:dur="0" advTm="0"/>
     </mc:Choice>
-    <mc:Fallback>
+    <mc:Fallback xmlns="">
       <p:transition advTm="0"/>
     </mc:Fallback>
   </mc:AlternateContent>

</xml_diff>